<commit_message>
he terminado lo de camilo
</commit_message>
<xml_diff>
--- a/agileTesting.pptx
+++ b/agileTesting.pptx
@@ -5,15 +5,16 @@
     <p:sldMasterId id="2147483648" r:id="rId1"/>
   </p:sldMasterIdLst>
   <p:notesMasterIdLst>
-    <p:notesMasterId r:id="rId5"/>
+    <p:notesMasterId r:id="rId6"/>
   </p:notesMasterIdLst>
   <p:handoutMasterIdLst>
-    <p:handoutMasterId r:id="rId6"/>
+    <p:handoutMasterId r:id="rId7"/>
   </p:handoutMasterIdLst>
   <p:sldIdLst>
     <p:sldId id="256" r:id="rId2"/>
     <p:sldId id="257" r:id="rId3"/>
     <p:sldId id="258" r:id="rId4"/>
+    <p:sldId id="259" r:id="rId5"/>
   </p:sldIdLst>
   <p:sldSz cx="12192000" cy="6858000"/>
   <p:notesSz cx="6858000" cy="9144000"/>
@@ -8024,6 +8025,383 @@
     <p:extLst>
       <p:ext uri="{BB962C8B-B14F-4D97-AF65-F5344CB8AC3E}">
         <p14:creationId xmlns:p14="http://schemas.microsoft.com/office/powerpoint/2010/main" val="562149943"/>
+      </p:ext>
+    </p:extLst>
+  </p:cSld>
+  <p:clrMapOvr>
+    <a:masterClrMapping/>
+  </p:clrMapOvr>
+</p:sld>
+</file>
+
+<file path=ppt/slides/slide4.xml><?xml version="1.0" encoding="utf-8"?>
+<p:sld xmlns:a="http://schemas.openxmlformats.org/drawingml/2006/main" xmlns:r="http://schemas.openxmlformats.org/officeDocument/2006/relationships" xmlns:p="http://schemas.openxmlformats.org/presentationml/2006/main">
+  <p:cSld>
+    <p:spTree>
+      <p:nvGrpSpPr>
+        <p:cNvPr id="1" name=""/>
+        <p:cNvGrpSpPr/>
+        <p:nvPr/>
+      </p:nvGrpSpPr>
+      <p:grpSpPr>
+        <a:xfrm>
+          <a:off x="0" y="0"/>
+          <a:ext cx="0" cy="0"/>
+          <a:chOff x="0" y="0"/>
+          <a:chExt cx="0" cy="0"/>
+        </a:xfrm>
+      </p:grpSpPr>
+      <p:sp>
+        <p:nvSpPr>
+          <p:cNvPr id="2" name="Título 1">
+            <a:extLst>
+              <a:ext uri="{FF2B5EF4-FFF2-40B4-BE49-F238E27FC236}">
+                <a16:creationId xmlns:a16="http://schemas.microsoft.com/office/drawing/2014/main" id="{65987171-CCE0-46CC-A79F-31407B190222}"/>
+              </a:ext>
+            </a:extLst>
+          </p:cNvPr>
+          <p:cNvSpPr>
+            <a:spLocks noGrp="1"/>
+          </p:cNvSpPr>
+          <p:nvPr>
+            <p:ph type="title"/>
+          </p:nvPr>
+        </p:nvSpPr>
+        <p:spPr>
+          <a:xfrm>
+            <a:off x="1141413" y="246743"/>
+            <a:ext cx="9905998" cy="1905000"/>
+          </a:xfrm>
+        </p:spPr>
+        <p:txBody>
+          <a:bodyPr/>
+          <a:lstStyle/>
+          <a:p>
+            <a:pPr algn="ctr"/>
+            <a:r>
+              <a:rPr lang="es-ES" dirty="0">
+                <a:effectLst>
+                  <a:glow rad="38100">
+                    <a:prstClr val="black">
+                      <a:lumMod val="65000"/>
+                      <a:lumOff val="35000"/>
+                      <a:alpha val="40000"/>
+                    </a:prstClr>
+                  </a:glow>
+                  <a:outerShdw blurRad="28575" dist="38100" dir="14040000" algn="tl" rotWithShape="0">
+                    <a:srgbClr val="000000">
+                      <a:alpha val="25000"/>
+                    </a:srgbClr>
+                  </a:outerShdw>
+                </a:effectLst>
+              </a:rPr>
+              <a:t>¿Cómo funciona?</a:t>
+            </a:r>
+          </a:p>
+        </p:txBody>
+      </p:sp>
+      <p:sp>
+        <p:nvSpPr>
+          <p:cNvPr id="3" name="Marcador de contenido 2">
+            <a:extLst>
+              <a:ext uri="{FF2B5EF4-FFF2-40B4-BE49-F238E27FC236}">
+                <a16:creationId xmlns:a16="http://schemas.microsoft.com/office/drawing/2014/main" id="{8BB23BD2-898D-45C1-A298-0357D6C7B50B}"/>
+              </a:ext>
+            </a:extLst>
+          </p:cNvPr>
+          <p:cNvSpPr>
+            <a:spLocks noGrp="1"/>
+          </p:cNvSpPr>
+          <p:nvPr>
+            <p:ph idx="1"/>
+          </p:nvPr>
+        </p:nvSpPr>
+        <p:spPr>
+          <a:xfrm>
+            <a:off x="1177699" y="2095500"/>
+            <a:ext cx="9905998" cy="4766128"/>
+          </a:xfrm>
+        </p:spPr>
+        <p:txBody>
+          <a:bodyPr/>
+          <a:lstStyle/>
+          <a:p>
+            <a:pPr>
+              <a:buClr>
+                <a:srgbClr val="FFFFFF"/>
+              </a:buClr>
+            </a:pPr>
+            <a:r>
+              <a:rPr lang="es-ES" dirty="0">
+                <a:effectLst>
+                  <a:glow rad="38100">
+                    <a:prstClr val="black">
+                      <a:lumMod val="50000"/>
+                      <a:lumOff val="50000"/>
+                      <a:alpha val="20000"/>
+                    </a:prstClr>
+                  </a:glow>
+                  <a:outerShdw blurRad="44450" dist="12700" dir="13860000" algn="tl" rotWithShape="0">
+                    <a:srgbClr val="000000">
+                      <a:alpha val="20000"/>
+                    </a:srgbClr>
+                  </a:outerShdw>
+                </a:effectLst>
+              </a:rPr>
+              <a:t>La metodología ágil consiste en dividir el tiempo de trabajo en </a:t>
+            </a:r>
+            <a:r>
+              <a:rPr lang="es-ES" dirty="0" err="1">
+                <a:effectLst>
+                  <a:glow rad="38100">
+                    <a:prstClr val="black">
+                      <a:lumMod val="50000"/>
+                      <a:lumOff val="50000"/>
+                      <a:alpha val="20000"/>
+                    </a:prstClr>
+                  </a:glow>
+                  <a:outerShdw blurRad="44450" dist="12700" dir="13860000" algn="tl" rotWithShape="0">
+                    <a:srgbClr val="000000">
+                      <a:alpha val="20000"/>
+                    </a:srgbClr>
+                  </a:outerShdw>
+                </a:effectLst>
+              </a:rPr>
+              <a:t>Sprints</a:t>
+            </a:r>
+            <a:endParaRPr lang="es-ES" dirty="0">
+              <a:effectLst>
+                <a:glow rad="38100">
+                  <a:prstClr val="black">
+                    <a:lumMod val="50000"/>
+                    <a:lumOff val="50000"/>
+                    <a:alpha val="20000"/>
+                  </a:prstClr>
+                </a:glow>
+                <a:outerShdw blurRad="44450" dist="12700" dir="13860000" algn="tl" rotWithShape="0">
+                  <a:srgbClr val="000000">
+                    <a:alpha val="20000"/>
+                  </a:srgbClr>
+                </a:outerShdw>
+              </a:effectLst>
+            </a:endParaRPr>
+          </a:p>
+          <a:p>
+            <a:pPr>
+              <a:buClr>
+                <a:srgbClr val="FFFFFF"/>
+              </a:buClr>
+            </a:pPr>
+            <a:r>
+              <a:rPr lang="es-ES" dirty="0">
+                <a:effectLst>
+                  <a:glow rad="38100">
+                    <a:prstClr val="black">
+                      <a:lumMod val="50000"/>
+                      <a:lumOff val="50000"/>
+                      <a:alpha val="20000"/>
+                    </a:prstClr>
+                  </a:glow>
+                  <a:outerShdw blurRad="44450" dist="12700" dir="13860000" algn="tl" rotWithShape="0">
+                    <a:srgbClr val="000000">
+                      <a:alpha val="20000"/>
+                    </a:srgbClr>
+                  </a:outerShdw>
+                </a:effectLst>
+              </a:rPr>
+              <a:t>Cada Sprint tiene una duración de entre 2 y 4 semanas</a:t>
+            </a:r>
+          </a:p>
+          <a:p>
+            <a:pPr>
+              <a:buClr>
+                <a:srgbClr val="FFFFFF"/>
+              </a:buClr>
+            </a:pPr>
+            <a:r>
+              <a:rPr lang="es-ES" dirty="0">
+                <a:effectLst>
+                  <a:glow rad="38100">
+                    <a:prstClr val="black">
+                      <a:lumMod val="50000"/>
+                      <a:lumOff val="50000"/>
+                      <a:alpha val="20000"/>
+                    </a:prstClr>
+                  </a:glow>
+                  <a:outerShdw blurRad="44450" dist="12700" dir="13860000" algn="tl" rotWithShape="0">
+                    <a:srgbClr val="000000">
+                      <a:alpha val="20000"/>
+                    </a:srgbClr>
+                  </a:outerShdw>
+                </a:effectLst>
+              </a:rPr>
+              <a:t>Al final de cada Sprint vamos a tener funcionalidades listas para la utilización del cliente</a:t>
+            </a:r>
+          </a:p>
+          <a:p>
+            <a:pPr>
+              <a:buClr>
+                <a:srgbClr val="FFFFFF"/>
+              </a:buClr>
+            </a:pPr>
+            <a:r>
+              <a:rPr lang="es-ES" dirty="0">
+                <a:effectLst>
+                  <a:glow rad="38100">
+                    <a:prstClr val="black">
+                      <a:lumMod val="50000"/>
+                      <a:lumOff val="50000"/>
+                      <a:alpha val="20000"/>
+                    </a:prstClr>
+                  </a:glow>
+                  <a:outerShdw blurRad="44450" dist="12700" dir="13860000" algn="tl" rotWithShape="0">
+                    <a:srgbClr val="000000">
+                      <a:alpha val="20000"/>
+                    </a:srgbClr>
+                  </a:outerShdw>
+                </a:effectLst>
+              </a:rPr>
+              <a:t>Se pueden plantear 2 tipos de planificación</a:t>
+            </a:r>
+          </a:p>
+          <a:p>
+            <a:pPr lvl="1">
+              <a:buClr>
+                <a:srgbClr val="FFFFFF"/>
+              </a:buClr>
+            </a:pPr>
+            <a:r>
+              <a:rPr lang="es-ES" dirty="0" err="1">
+                <a:effectLst>
+                  <a:glow rad="38100">
+                    <a:prstClr val="black">
+                      <a:lumMod val="50000"/>
+                      <a:lumOff val="50000"/>
+                      <a:alpha val="20000"/>
+                    </a:prstClr>
+                  </a:glow>
+                  <a:outerShdw blurRad="44450" dist="12700" dir="13860000" algn="tl" rotWithShape="0">
+                    <a:srgbClr val="000000">
+                      <a:alpha val="20000"/>
+                    </a:srgbClr>
+                  </a:outerShdw>
+                </a:effectLst>
+              </a:rPr>
+              <a:t>Release</a:t>
+            </a:r>
+            <a:r>
+              <a:rPr lang="es-ES" dirty="0">
+                <a:effectLst>
+                  <a:glow rad="38100">
+                    <a:prstClr val="black">
+                      <a:lumMod val="50000"/>
+                      <a:lumOff val="50000"/>
+                      <a:alpha val="20000"/>
+                    </a:prstClr>
+                  </a:glow>
+                  <a:outerShdw blurRad="44450" dist="12700" dir="13860000" algn="tl" rotWithShape="0">
+                    <a:srgbClr val="000000">
+                      <a:alpha val="20000"/>
+                    </a:srgbClr>
+                  </a:outerShdw>
+                </a:effectLst>
+              </a:rPr>
+              <a:t> o entrega: Al recibir el </a:t>
+            </a:r>
+            <a:r>
+              <a:rPr lang="es-ES" dirty="0" err="1">
+                <a:effectLst>
+                  <a:glow rad="38100">
+                    <a:prstClr val="black">
+                      <a:lumMod val="50000"/>
+                      <a:lumOff val="50000"/>
+                      <a:alpha val="20000"/>
+                    </a:prstClr>
+                  </a:glow>
+                  <a:outerShdw blurRad="44450" dist="12700" dir="13860000" algn="tl" rotWithShape="0">
+                    <a:srgbClr val="000000">
+                      <a:alpha val="20000"/>
+                    </a:srgbClr>
+                  </a:outerShdw>
+                </a:effectLst>
+              </a:rPr>
+              <a:t>feedback</a:t>
+            </a:r>
+            <a:r>
+              <a:rPr lang="es-ES" dirty="0">
+                <a:effectLst>
+                  <a:glow rad="38100">
+                    <a:prstClr val="black">
+                      <a:lumMod val="50000"/>
+                      <a:lumOff val="50000"/>
+                      <a:alpha val="20000"/>
+                    </a:prstClr>
+                  </a:glow>
+                  <a:outerShdw blurRad="44450" dist="12700" dir="13860000" algn="tl" rotWithShape="0">
+                    <a:srgbClr val="000000">
+                      <a:alpha val="20000"/>
+                    </a:srgbClr>
+                  </a:outerShdw>
+                </a:effectLst>
+              </a:rPr>
+              <a:t> del cliente</a:t>
+            </a:r>
+          </a:p>
+          <a:p>
+            <a:pPr lvl="1">
+              <a:buClr>
+                <a:srgbClr val="FFFFFF"/>
+              </a:buClr>
+            </a:pPr>
+            <a:r>
+              <a:rPr lang="es-ES" dirty="0">
+                <a:effectLst>
+                  <a:glow rad="38100">
+                    <a:prstClr val="black">
+                      <a:lumMod val="50000"/>
+                      <a:lumOff val="50000"/>
+                      <a:alpha val="20000"/>
+                    </a:prstClr>
+                  </a:glow>
+                  <a:outerShdw blurRad="44450" dist="12700" dir="13860000" algn="tl" rotWithShape="0">
+                    <a:srgbClr val="000000">
+                      <a:alpha val="20000"/>
+                    </a:srgbClr>
+                  </a:outerShdw>
+                </a:effectLst>
+              </a:rPr>
+              <a:t>Sprint: Al principio de este</a:t>
+            </a:r>
+          </a:p>
+          <a:p>
+            <a:pPr>
+              <a:buClr>
+                <a:srgbClr val="FFFFFF"/>
+              </a:buClr>
+            </a:pPr>
+            <a:endParaRPr lang="es-ES" u="sng" dirty="0">
+              <a:effectLst>
+                <a:glow rad="38100">
+                  <a:prstClr val="black">
+                    <a:lumMod val="50000"/>
+                    <a:lumOff val="50000"/>
+                    <a:alpha val="20000"/>
+                  </a:prstClr>
+                </a:glow>
+                <a:outerShdw blurRad="44450" dist="12700" dir="13860000" algn="tl" rotWithShape="0">
+                  <a:srgbClr val="000000">
+                    <a:alpha val="20000"/>
+                  </a:srgbClr>
+                </a:outerShdw>
+              </a:effectLst>
+            </a:endParaRPr>
+          </a:p>
+        </p:txBody>
+      </p:sp>
+    </p:spTree>
+    <p:extLst>
+      <p:ext uri="{BB962C8B-B14F-4D97-AF65-F5344CB8AC3E}">
+        <p14:creationId xmlns:p14="http://schemas.microsoft.com/office/powerpoint/2010/main" val="3107709963"/>
       </p:ext>
     </p:extLst>
   </p:cSld>

</xml_diff>